<commit_message>
docs: Update presentation file
Modified presentation after testing and validation
</commit_message>
<xml_diff>
--- a/AjB4APP_Presentation.pptx
+++ b/AjB4APP_Presentation.pptx
@@ -18,7 +18,9 @@
     <p:sldId id="266" r:id="rId12"/>
     <p:sldId id="267" r:id="rId13"/>
     <p:sldId id="268" r:id="rId14"/>
-    <p:sldId id="270" r:id="rId15"/>
+    <p:sldId id="272" r:id="rId15"/>
+    <p:sldId id="271" r:id="rId16"/>
+    <p:sldId id="270" r:id="rId17"/>
   </p:sldIdLst>
   <p:sldSz cx="9144000" cy="5143500" type="screen16x9"/>
   <p:notesSz cx="6858000" cy="9144000"/>
@@ -29446,8 +29448,8 @@
         </p:nvSpPr>
         <p:spPr>
           <a:xfrm>
-            <a:off x="2438400" y="915945"/>
-            <a:ext cx="5161005" cy="3311610"/>
+            <a:off x="3378401" y="915945"/>
+            <a:ext cx="4221004" cy="3311610"/>
           </a:xfrm>
         </p:spPr>
         <p:txBody>
@@ -29463,7 +29465,22 @@
                   <a:schemeClr val="tx2"/>
                 </a:solidFill>
               </a:rPr>
-              <a:t>6.Conclusion</a:t>
+              <a:t>6.Github </a:t>
+            </a:r>
+            <a:br>
+              <a:rPr lang="en-US" sz="5400" dirty="0">
+                <a:solidFill>
+                  <a:schemeClr val="tx2"/>
+                </a:solidFill>
+              </a:rPr>
+            </a:br>
+            <a:r>
+              <a:rPr lang="en-US" sz="5400" dirty="0">
+                <a:solidFill>
+                  <a:schemeClr val="tx2"/>
+                </a:solidFill>
+              </a:rPr>
+              <a:t>Repository</a:t>
             </a:r>
           </a:p>
         </p:txBody>
@@ -29532,6 +29549,1626 @@
 </file>
 
 <file path=ppt/slides/slide14.xml><?xml version="1.0" encoding="utf-8"?>
+<p:sld xmlns:a="http://schemas.openxmlformats.org/drawingml/2006/main" xmlns:r="http://schemas.openxmlformats.org/officeDocument/2006/relationships" xmlns:p="http://schemas.openxmlformats.org/presentationml/2006/main">
+  <p:cSld>
+    <p:bg>
+      <p:bgPr>
+        <a:solidFill>
+          <a:schemeClr val="bg1"/>
+        </a:solidFill>
+        <a:effectLst/>
+      </p:bgPr>
+    </p:bg>
+    <p:spTree>
+      <p:nvGrpSpPr>
+        <p:cNvPr id="1" name=""/>
+        <p:cNvGrpSpPr/>
+        <p:nvPr/>
+      </p:nvGrpSpPr>
+      <p:grpSpPr>
+        <a:xfrm>
+          <a:off x="0" y="0"/>
+          <a:ext cx="0" cy="0"/>
+          <a:chOff x="0" y="0"/>
+          <a:chExt cx="0" cy="0"/>
+        </a:xfrm>
+      </p:grpSpPr>
+      <p:grpSp>
+        <p:nvGrpSpPr>
+          <p:cNvPr id="8" name="Group 7">
+            <a:extLst>
+              <a:ext uri="{FF2B5EF4-FFF2-40B4-BE49-F238E27FC236}">
+                <a16:creationId xmlns:a16="http://schemas.microsoft.com/office/drawing/2014/main" id="{93E10248-AF0E-477D-B4D2-47C02CE4E353}"/>
+              </a:ext>
+              <a:ext uri="{C183D7F6-B498-43B3-948B-1728B52AA6E4}">
+                <adec:decorative xmlns:adec="http://schemas.microsoft.com/office/drawing/2017/decorative" val="1"/>
+              </a:ext>
+            </a:extLst>
+          </p:cNvPr>
+          <p:cNvGrpSpPr>
+            <a:grpSpLocks noGrp="1" noUngrp="1" noRot="1" noChangeAspect="1" noMove="1" noResize="1"/>
+          </p:cNvGrpSpPr>
+          <p:nvPr>
+            <p:extLst>
+              <p:ext uri="{386F3935-93C4-4BCD-93E2-E3B085C9AB24}">
+                <p16:designElem xmlns:p16="http://schemas.microsoft.com/office/powerpoint/2015/main" val="1"/>
+              </p:ext>
+            </p:extLst>
+          </p:nvPr>
+        </p:nvGrpSpPr>
+        <p:grpSpPr>
+          <a:xfrm>
+            <a:off x="0" y="0"/>
+            <a:ext cx="9144000" cy="5143500"/>
+            <a:chOff x="0" y="0"/>
+            <a:chExt cx="12192000" cy="6858000"/>
+          </a:xfrm>
+        </p:grpSpPr>
+        <p:sp>
+          <p:nvSpPr>
+            <p:cNvPr id="9" name="Rectangle 8">
+              <a:extLst>
+                <a:ext uri="{FF2B5EF4-FFF2-40B4-BE49-F238E27FC236}">
+                  <a16:creationId xmlns:a16="http://schemas.microsoft.com/office/drawing/2014/main" id="{533010C2-2DA5-460F-A40C-5317F567A03E}"/>
+                </a:ext>
+                <a:ext uri="{C183D7F6-B498-43B3-948B-1728B52AA6E4}">
+                  <adec:decorative xmlns:adec="http://schemas.microsoft.com/office/drawing/2017/decorative" val="1"/>
+                </a:ext>
+              </a:extLst>
+            </p:cNvPr>
+            <p:cNvSpPr/>
+            <p:nvPr>
+              <p:extLst>
+                <p:ext uri="{386F3935-93C4-4BCD-93E2-E3B085C9AB24}">
+                  <p16:designElem xmlns:p16="http://schemas.microsoft.com/office/powerpoint/2015/main" val="1"/>
+                </p:ext>
+              </p:extLst>
+            </p:nvPr>
+          </p:nvSpPr>
+          <p:spPr>
+            <a:xfrm>
+              <a:off x="0" y="0"/>
+              <a:ext cx="12192000" cy="6858000"/>
+            </a:xfrm>
+            <a:prstGeom prst="rect">
+              <a:avLst/>
+            </a:prstGeom>
+            <a:blipFill>
+              <a:blip r:embed="rId2">
+                <a:duotone>
+                  <a:schemeClr val="dk2">
+                    <a:shade val="69000"/>
+                    <a:hueMod val="91000"/>
+                    <a:satMod val="164000"/>
+                    <a:lumMod val="74000"/>
+                  </a:schemeClr>
+                  <a:schemeClr val="dk2">
+                    <a:hueMod val="124000"/>
+                    <a:satMod val="140000"/>
+                    <a:lumMod val="142000"/>
+                  </a:schemeClr>
+                </a:duotone>
+              </a:blip>
+              <a:stretch>
+                <a:fillRect/>
+              </a:stretch>
+            </a:blipFill>
+            <a:ln>
+              <a:noFill/>
+            </a:ln>
+          </p:spPr>
+          <p:style>
+            <a:lnRef idx="2">
+              <a:schemeClr val="accent1">
+                <a:shade val="50000"/>
+              </a:schemeClr>
+            </a:lnRef>
+            <a:fillRef idx="1">
+              <a:schemeClr val="accent1"/>
+            </a:fillRef>
+            <a:effectRef idx="0">
+              <a:schemeClr val="accent1"/>
+            </a:effectRef>
+            <a:fontRef idx="minor">
+              <a:schemeClr val="lt1"/>
+            </a:fontRef>
+          </p:style>
+          <p:txBody>
+            <a:bodyPr/>
+            <a:lstStyle/>
+            <a:p>
+              <a:endParaRPr lang="en-US"/>
+            </a:p>
+          </p:txBody>
+        </p:sp>
+        <p:sp>
+          <p:nvSpPr>
+            <p:cNvPr id="10" name="Freeform 5">
+              <a:extLst>
+                <a:ext uri="{FF2B5EF4-FFF2-40B4-BE49-F238E27FC236}">
+                  <a16:creationId xmlns:a16="http://schemas.microsoft.com/office/drawing/2014/main" id="{17CB0634-F963-4EC9-A6F6-8EA46BD1F103}"/>
+                </a:ext>
+                <a:ext uri="{C183D7F6-B498-43B3-948B-1728B52AA6E4}">
+                  <adec:decorative xmlns:adec="http://schemas.microsoft.com/office/drawing/2017/decorative" val="1"/>
+                </a:ext>
+              </a:extLst>
+            </p:cNvPr>
+            <p:cNvSpPr>
+              <a:spLocks noEditPoints="1"/>
+            </p:cNvSpPr>
+            <p:nvPr>
+              <p:extLst>
+                <p:ext uri="{386F3935-93C4-4BCD-93E2-E3B085C9AB24}">
+                  <p16:designElem xmlns:p16="http://schemas.microsoft.com/office/powerpoint/2015/main" val="1"/>
+                </p:ext>
+              </p:extLst>
+            </p:nvPr>
+          </p:nvSpPr>
+          <p:spPr bwMode="gray">
+            <a:xfrm>
+              <a:off x="0" y="1587"/>
+              <a:ext cx="12192000" cy="6856413"/>
+            </a:xfrm>
+            <a:custGeom>
+              <a:avLst/>
+              <a:gdLst/>
+              <a:ahLst/>
+              <a:cxnLst/>
+              <a:rect l="0" t="0" r="r" b="b"/>
+              <a:pathLst>
+                <a:path w="15356" h="8638">
+                  <a:moveTo>
+                    <a:pt x="0" y="0"/>
+                  </a:moveTo>
+                  <a:lnTo>
+                    <a:pt x="0" y="8638"/>
+                  </a:lnTo>
+                  <a:lnTo>
+                    <a:pt x="15356" y="8638"/>
+                  </a:lnTo>
+                  <a:lnTo>
+                    <a:pt x="15356" y="0"/>
+                  </a:lnTo>
+                  <a:lnTo>
+                    <a:pt x="0" y="0"/>
+                  </a:lnTo>
+                  <a:close/>
+                  <a:moveTo>
+                    <a:pt x="14748" y="8038"/>
+                  </a:moveTo>
+                  <a:lnTo>
+                    <a:pt x="600" y="8038"/>
+                  </a:lnTo>
+                  <a:lnTo>
+                    <a:pt x="600" y="592"/>
+                  </a:lnTo>
+                  <a:lnTo>
+                    <a:pt x="14748" y="592"/>
+                  </a:lnTo>
+                  <a:lnTo>
+                    <a:pt x="14748" y="8038"/>
+                  </a:lnTo>
+                  <a:close/>
+                </a:path>
+              </a:pathLst>
+            </a:custGeom>
+            <a:solidFill>
+              <a:schemeClr val="bg1"/>
+            </a:solidFill>
+            <a:ln>
+              <a:noFill/>
+            </a:ln>
+          </p:spPr>
+          <p:txBody>
+            <a:bodyPr/>
+            <a:lstStyle/>
+            <a:p>
+              <a:endParaRPr lang="en-US"/>
+            </a:p>
+          </p:txBody>
+        </p:sp>
+      </p:grpSp>
+      <p:sp>
+        <p:nvSpPr>
+          <p:cNvPr id="12" name="Rectangle 11">
+            <a:extLst>
+              <a:ext uri="{FF2B5EF4-FFF2-40B4-BE49-F238E27FC236}">
+                <a16:creationId xmlns:a16="http://schemas.microsoft.com/office/drawing/2014/main" id="{73C0A186-7444-4460-9C37-532E7671E99E}"/>
+              </a:ext>
+              <a:ext uri="{C183D7F6-B498-43B3-948B-1728B52AA6E4}">
+                <adec:decorative xmlns:adec="http://schemas.microsoft.com/office/drawing/2017/decorative" val="1"/>
+              </a:ext>
+            </a:extLst>
+          </p:cNvPr>
+          <p:cNvSpPr>
+            <a:spLocks noGrp="1" noRot="1" noChangeAspect="1" noMove="1" noResize="1" noEditPoints="1" noAdjustHandles="1" noChangeArrowheads="1" noChangeShapeType="1" noTextEdit="1"/>
+          </p:cNvSpPr>
+          <p:nvPr>
+            <p:extLst>
+              <p:ext uri="{386F3935-93C4-4BCD-93E2-E3B085C9AB24}">
+                <p16:designElem xmlns:p16="http://schemas.microsoft.com/office/powerpoint/2015/main" val="1"/>
+              </p:ext>
+            </p:extLst>
+          </p:nvPr>
+        </p:nvSpPr>
+        <p:spPr>
+          <a:xfrm>
+            <a:off x="7828359" y="0"/>
+            <a:ext cx="514350" cy="857250"/>
+          </a:xfrm>
+          <a:prstGeom prst="rect">
+            <a:avLst/>
+          </a:prstGeom>
+          <a:solidFill>
+            <a:schemeClr val="accent1"/>
+          </a:solidFill>
+          <a:ln>
+            <a:noFill/>
+          </a:ln>
+        </p:spPr>
+        <p:style>
+          <a:lnRef idx="1">
+            <a:schemeClr val="accent1"/>
+          </a:lnRef>
+          <a:fillRef idx="3">
+            <a:schemeClr val="accent1"/>
+          </a:fillRef>
+          <a:effectRef idx="2">
+            <a:schemeClr val="accent1"/>
+          </a:effectRef>
+          <a:fontRef idx="minor">
+            <a:schemeClr val="lt1"/>
+          </a:fontRef>
+        </p:style>
+        <p:txBody>
+          <a:bodyPr/>
+          <a:lstStyle/>
+          <a:p>
+            <a:endParaRPr lang="en-US"/>
+          </a:p>
+        </p:txBody>
+      </p:sp>
+      <p:sp>
+        <p:nvSpPr>
+          <p:cNvPr id="14" name="Freeform 5">
+            <a:extLst>
+              <a:ext uri="{FF2B5EF4-FFF2-40B4-BE49-F238E27FC236}">
+                <a16:creationId xmlns:a16="http://schemas.microsoft.com/office/drawing/2014/main" id="{D22D1B95-2B54-43E9-85D9-B489F6C5DD0F}"/>
+              </a:ext>
+              <a:ext uri="{C183D7F6-B498-43B3-948B-1728B52AA6E4}">
+                <adec:decorative xmlns:adec="http://schemas.microsoft.com/office/drawing/2017/decorative" val="1"/>
+              </a:ext>
+            </a:extLst>
+          </p:cNvPr>
+          <p:cNvSpPr>
+            <a:spLocks noGrp="1" noRot="1" noChangeAspect="1" noMove="1" noResize="1" noEditPoints="1" noAdjustHandles="1" noChangeArrowheads="1" noChangeShapeType="1" noTextEdit="1"/>
+          </p:cNvSpPr>
+          <p:nvPr>
+            <p:extLst>
+              <p:ext uri="{386F3935-93C4-4BCD-93E2-E3B085C9AB24}">
+                <p16:designElem xmlns:p16="http://schemas.microsoft.com/office/powerpoint/2015/main" val="1"/>
+              </p:ext>
+            </p:extLst>
+          </p:nvPr>
+        </p:nvSpPr>
+        <p:spPr bwMode="gray">
+          <a:xfrm rot="21010068">
+            <a:off x="6368213" y="3138837"/>
+            <a:ext cx="2474555" cy="330693"/>
+          </a:xfrm>
+          <a:custGeom>
+            <a:avLst/>
+            <a:gdLst/>
+            <a:ahLst/>
+            <a:cxnLst/>
+            <a:rect l="l" t="t" r="r" b="b"/>
+            <a:pathLst>
+              <a:path w="10000" h="5291">
+                <a:moveTo>
+                  <a:pt x="85" y="2532"/>
+                </a:moveTo>
+                <a:cubicBezTo>
+                  <a:pt x="1736" y="3911"/>
+                  <a:pt x="7524" y="5298"/>
+                  <a:pt x="9958" y="5291"/>
+                </a:cubicBezTo>
+                <a:cubicBezTo>
+                  <a:pt x="9989" y="1958"/>
+                  <a:pt x="9969" y="3333"/>
+                  <a:pt x="10000" y="0"/>
+                </a:cubicBezTo>
+                <a:lnTo>
+                  <a:pt x="10000" y="0"/>
+                </a:lnTo>
+                <a:lnTo>
+                  <a:pt x="9667" y="204"/>
+                </a:lnTo>
+                <a:lnTo>
+                  <a:pt x="9334" y="400"/>
+                </a:lnTo>
+                <a:lnTo>
+                  <a:pt x="9001" y="590"/>
+                </a:lnTo>
+                <a:lnTo>
+                  <a:pt x="8667" y="753"/>
+                </a:lnTo>
+                <a:lnTo>
+                  <a:pt x="8333" y="917"/>
+                </a:lnTo>
+                <a:lnTo>
+                  <a:pt x="7999" y="1071"/>
+                </a:lnTo>
+                <a:lnTo>
+                  <a:pt x="7669" y="1202"/>
+                </a:lnTo>
+                <a:lnTo>
+                  <a:pt x="7333" y="1325"/>
+                </a:lnTo>
+                <a:lnTo>
+                  <a:pt x="7000" y="1440"/>
+                </a:lnTo>
+                <a:lnTo>
+                  <a:pt x="6673" y="1538"/>
+                </a:lnTo>
+                <a:lnTo>
+                  <a:pt x="6340" y="1636"/>
+                </a:lnTo>
+                <a:lnTo>
+                  <a:pt x="6013" y="1719"/>
+                </a:lnTo>
+                <a:lnTo>
+                  <a:pt x="5686" y="1784"/>
+                </a:lnTo>
+                <a:lnTo>
+                  <a:pt x="5359" y="1850"/>
+                </a:lnTo>
+                <a:lnTo>
+                  <a:pt x="5036" y="1906"/>
+                </a:lnTo>
+                <a:lnTo>
+                  <a:pt x="4717" y="1948"/>
+                </a:lnTo>
+                <a:lnTo>
+                  <a:pt x="4396" y="1980"/>
+                </a:lnTo>
+                <a:lnTo>
+                  <a:pt x="4079" y="2013"/>
+                </a:lnTo>
+                <a:lnTo>
+                  <a:pt x="3766" y="2029"/>
+                </a:lnTo>
+                <a:lnTo>
+                  <a:pt x="3454" y="2046"/>
+                </a:lnTo>
+                <a:lnTo>
+                  <a:pt x="3145" y="2053"/>
+                </a:lnTo>
+                <a:lnTo>
+                  <a:pt x="2839" y="2046"/>
+                </a:lnTo>
+                <a:lnTo>
+                  <a:pt x="2537" y="2046"/>
+                </a:lnTo>
+                <a:lnTo>
+                  <a:pt x="2238" y="2029"/>
+                </a:lnTo>
+                <a:lnTo>
+                  <a:pt x="1943" y="2004"/>
+                </a:lnTo>
+                <a:lnTo>
+                  <a:pt x="1653" y="1980"/>
+                </a:lnTo>
+                <a:lnTo>
+                  <a:pt x="1368" y="1955"/>
+                </a:lnTo>
+                <a:lnTo>
+                  <a:pt x="1085" y="1915"/>
+                </a:lnTo>
+                <a:lnTo>
+                  <a:pt x="806" y="1873"/>
+                </a:lnTo>
+                <a:lnTo>
+                  <a:pt x="533" y="1833"/>
+                </a:lnTo>
+                <a:lnTo>
+                  <a:pt x="0" y="1726"/>
+                </a:lnTo>
+                <a:cubicBezTo>
+                  <a:pt x="28" y="1995"/>
+                  <a:pt x="57" y="2263"/>
+                  <a:pt x="85" y="2532"/>
+                </a:cubicBezTo>
+                <a:close/>
+              </a:path>
+            </a:pathLst>
+          </a:custGeom>
+          <a:solidFill>
+            <a:schemeClr val="bg1">
+              <a:alpha val="20000"/>
+            </a:schemeClr>
+          </a:solidFill>
+          <a:ln>
+            <a:noFill/>
+          </a:ln>
+        </p:spPr>
+        <p:txBody>
+          <a:bodyPr/>
+          <a:lstStyle/>
+          <a:p>
+            <a:endParaRPr lang="en-US"/>
+          </a:p>
+        </p:txBody>
+      </p:sp>
+      <p:sp>
+        <p:nvSpPr>
+          <p:cNvPr id="16" name="Freeform 5">
+            <a:extLst>
+              <a:ext uri="{FF2B5EF4-FFF2-40B4-BE49-F238E27FC236}">
+                <a16:creationId xmlns:a16="http://schemas.microsoft.com/office/drawing/2014/main" id="{7D0F3F6D-A49D-4406-8D61-1C4F8D792F04}"/>
+              </a:ext>
+              <a:ext uri="{C183D7F6-B498-43B3-948B-1728B52AA6E4}">
+                <adec:decorative xmlns:adec="http://schemas.microsoft.com/office/drawing/2017/decorative" val="1"/>
+              </a:ext>
+            </a:extLst>
+          </p:cNvPr>
+          <p:cNvSpPr>
+            <a:spLocks noGrp="1" noRot="1" noChangeAspect="1" noMove="1" noResize="1" noEditPoints="1" noAdjustHandles="1" noChangeArrowheads="1" noChangeShapeType="1" noTextEdit="1"/>
+          </p:cNvSpPr>
+          <p:nvPr>
+            <p:extLst>
+              <p:ext uri="{386F3935-93C4-4BCD-93E2-E3B085C9AB24}">
+                <p16:designElem xmlns:p16="http://schemas.microsoft.com/office/powerpoint/2015/main" val="1"/>
+              </p:ext>
+            </p:extLst>
+          </p:nvPr>
+        </p:nvSpPr>
+        <p:spPr bwMode="gray">
+          <a:xfrm>
+            <a:off x="341709" y="3181350"/>
+            <a:ext cx="8458200" cy="1752871"/>
+          </a:xfrm>
+          <a:custGeom>
+            <a:avLst/>
+            <a:gdLst/>
+            <a:ahLst/>
+            <a:cxnLst/>
+            <a:rect l="l" t="t" r="r" b="b"/>
+            <a:pathLst>
+              <a:path w="10000" h="8000">
+                <a:moveTo>
+                  <a:pt x="0" y="0"/>
+                </a:moveTo>
+                <a:lnTo>
+                  <a:pt x="0" y="7970"/>
+                </a:lnTo>
+                <a:lnTo>
+                  <a:pt x="10000" y="8000"/>
+                </a:lnTo>
+                <a:lnTo>
+                  <a:pt x="10000" y="7"/>
+                </a:lnTo>
+                <a:lnTo>
+                  <a:pt x="10000" y="7"/>
+                </a:lnTo>
+                <a:lnTo>
+                  <a:pt x="9773" y="156"/>
+                </a:lnTo>
+                <a:lnTo>
+                  <a:pt x="9547" y="298"/>
+                </a:lnTo>
+                <a:lnTo>
+                  <a:pt x="9320" y="437"/>
+                </a:lnTo>
+                <a:lnTo>
+                  <a:pt x="9092" y="556"/>
+                </a:lnTo>
+                <a:lnTo>
+                  <a:pt x="8865" y="676"/>
+                </a:lnTo>
+                <a:lnTo>
+                  <a:pt x="8637" y="788"/>
+                </a:lnTo>
+                <a:lnTo>
+                  <a:pt x="8412" y="884"/>
+                </a:lnTo>
+                <a:lnTo>
+                  <a:pt x="8184" y="975"/>
+                </a:lnTo>
+                <a:lnTo>
+                  <a:pt x="7957" y="1058"/>
+                </a:lnTo>
+                <a:lnTo>
+                  <a:pt x="7734" y="1130"/>
+                </a:lnTo>
+                <a:lnTo>
+                  <a:pt x="7508" y="1202"/>
+                </a:lnTo>
+                <a:lnTo>
+                  <a:pt x="7285" y="1262"/>
+                </a:lnTo>
+                <a:lnTo>
+                  <a:pt x="7062" y="1309"/>
+                </a:lnTo>
+                <a:lnTo>
+                  <a:pt x="6840" y="1358"/>
+                </a:lnTo>
+                <a:lnTo>
+                  <a:pt x="6620" y="1399"/>
+                </a:lnTo>
+                <a:lnTo>
+                  <a:pt x="6402" y="1428"/>
+                </a:lnTo>
+                <a:lnTo>
+                  <a:pt x="6184" y="1453"/>
+                </a:lnTo>
+                <a:lnTo>
+                  <a:pt x="5968" y="1477"/>
+                </a:lnTo>
+                <a:lnTo>
+                  <a:pt x="5755" y="1488"/>
+                </a:lnTo>
+                <a:lnTo>
+                  <a:pt x="5542" y="1500"/>
+                </a:lnTo>
+                <a:lnTo>
+                  <a:pt x="5332" y="1506"/>
+                </a:lnTo>
+                <a:lnTo>
+                  <a:pt x="5124" y="1500"/>
+                </a:lnTo>
+                <a:lnTo>
+                  <a:pt x="4918" y="1500"/>
+                </a:lnTo>
+                <a:lnTo>
+                  <a:pt x="4714" y="1488"/>
+                </a:lnTo>
+                <a:lnTo>
+                  <a:pt x="4514" y="1470"/>
+                </a:lnTo>
+                <a:lnTo>
+                  <a:pt x="4316" y="1453"/>
+                </a:lnTo>
+                <a:lnTo>
+                  <a:pt x="4122" y="1434"/>
+                </a:lnTo>
+                <a:lnTo>
+                  <a:pt x="3929" y="1405"/>
+                </a:lnTo>
+                <a:lnTo>
+                  <a:pt x="3739" y="1374"/>
+                </a:lnTo>
+                <a:lnTo>
+                  <a:pt x="3553" y="1346"/>
+                </a:lnTo>
+                <a:lnTo>
+                  <a:pt x="3190" y="1267"/>
+                </a:lnTo>
+                <a:lnTo>
+                  <a:pt x="2842" y="1183"/>
+                </a:lnTo>
+                <a:lnTo>
+                  <a:pt x="2508" y="1095"/>
+                </a:lnTo>
+                <a:lnTo>
+                  <a:pt x="2192" y="998"/>
+                </a:lnTo>
+                <a:lnTo>
+                  <a:pt x="1890" y="897"/>
+                </a:lnTo>
+                <a:lnTo>
+                  <a:pt x="1610" y="788"/>
+                </a:lnTo>
+                <a:lnTo>
+                  <a:pt x="1347" y="681"/>
+                </a:lnTo>
+                <a:lnTo>
+                  <a:pt x="1105" y="574"/>
+                </a:lnTo>
+                <a:lnTo>
+                  <a:pt x="883" y="473"/>
+                </a:lnTo>
+                <a:lnTo>
+                  <a:pt x="686" y="377"/>
+                </a:lnTo>
+                <a:lnTo>
+                  <a:pt x="508" y="286"/>
+                </a:lnTo>
+                <a:lnTo>
+                  <a:pt x="358" y="210"/>
+                </a:lnTo>
+                <a:lnTo>
+                  <a:pt x="232" y="138"/>
+                </a:lnTo>
+                <a:lnTo>
+                  <a:pt x="59" y="35"/>
+                </a:lnTo>
+                <a:lnTo>
+                  <a:pt x="0" y="0"/>
+                </a:lnTo>
+                <a:lnTo>
+                  <a:pt x="0" y="0"/>
+                </a:lnTo>
+                <a:close/>
+              </a:path>
+            </a:pathLst>
+          </a:custGeom>
+          <a:solidFill>
+            <a:schemeClr val="bg1"/>
+          </a:solidFill>
+          <a:ln>
+            <a:noFill/>
+          </a:ln>
+        </p:spPr>
+        <p:txBody>
+          <a:bodyPr/>
+          <a:lstStyle/>
+          <a:p>
+            <a:endParaRPr lang="en-US"/>
+          </a:p>
+        </p:txBody>
+      </p:sp>
+      <p:sp>
+        <p:nvSpPr>
+          <p:cNvPr id="18" name="Freeform 5">
+            <a:extLst>
+              <a:ext uri="{FF2B5EF4-FFF2-40B4-BE49-F238E27FC236}">
+                <a16:creationId xmlns:a16="http://schemas.microsoft.com/office/drawing/2014/main" id="{D953A318-DA8D-4405-9536-D889E45C5E3E}"/>
+              </a:ext>
+              <a:ext uri="{C183D7F6-B498-43B3-948B-1728B52AA6E4}">
+                <adec:decorative xmlns:adec="http://schemas.microsoft.com/office/drawing/2017/decorative" val="1"/>
+              </a:ext>
+            </a:extLst>
+          </p:cNvPr>
+          <p:cNvSpPr>
+            <a:spLocks noGrp="1" noRot="1" noChangeAspect="1" noMove="1" noResize="1" noEditPoints="1" noAdjustHandles="1" noChangeArrowheads="1" noChangeShapeType="1" noTextEdit="1"/>
+          </p:cNvSpPr>
+          <p:nvPr>
+            <p:extLst>
+              <p:ext uri="{386F3935-93C4-4BCD-93E2-E3B085C9AB24}">
+                <p16:designElem xmlns:p16="http://schemas.microsoft.com/office/powerpoint/2015/main" val="1"/>
+              </p:ext>
+            </p:extLst>
+          </p:nvPr>
+        </p:nvSpPr>
+        <p:spPr bwMode="gray">
+          <a:xfrm>
+            <a:off x="0" y="1190"/>
+            <a:ext cx="9144000" cy="5142310"/>
+          </a:xfrm>
+          <a:custGeom>
+            <a:avLst/>
+            <a:gdLst/>
+            <a:ahLst/>
+            <a:cxnLst/>
+            <a:rect l="0" t="0" r="r" b="b"/>
+            <a:pathLst>
+              <a:path w="15356" h="8638">
+                <a:moveTo>
+                  <a:pt x="0" y="0"/>
+                </a:moveTo>
+                <a:lnTo>
+                  <a:pt x="0" y="8638"/>
+                </a:lnTo>
+                <a:lnTo>
+                  <a:pt x="15356" y="8638"/>
+                </a:lnTo>
+                <a:lnTo>
+                  <a:pt x="15356" y="0"/>
+                </a:lnTo>
+                <a:lnTo>
+                  <a:pt x="0" y="0"/>
+                </a:lnTo>
+                <a:close/>
+                <a:moveTo>
+                  <a:pt x="14748" y="8038"/>
+                </a:moveTo>
+                <a:lnTo>
+                  <a:pt x="600" y="8038"/>
+                </a:lnTo>
+                <a:lnTo>
+                  <a:pt x="600" y="592"/>
+                </a:lnTo>
+                <a:lnTo>
+                  <a:pt x="14748" y="592"/>
+                </a:lnTo>
+                <a:lnTo>
+                  <a:pt x="14748" y="8038"/>
+                </a:lnTo>
+                <a:close/>
+              </a:path>
+            </a:pathLst>
+          </a:custGeom>
+          <a:solidFill>
+            <a:schemeClr val="bg1"/>
+          </a:solidFill>
+          <a:ln>
+            <a:noFill/>
+          </a:ln>
+        </p:spPr>
+        <p:txBody>
+          <a:bodyPr/>
+          <a:lstStyle/>
+          <a:p>
+            <a:endParaRPr lang="en-US"/>
+          </a:p>
+        </p:txBody>
+      </p:sp>
+      <p:sp>
+        <p:nvSpPr>
+          <p:cNvPr id="20" name="Rectangle 19">
+            <a:extLst>
+              <a:ext uri="{FF2B5EF4-FFF2-40B4-BE49-F238E27FC236}">
+                <a16:creationId xmlns:a16="http://schemas.microsoft.com/office/drawing/2014/main" id="{9E382A3D-2F90-475C-8DF2-F666FEA3425B}"/>
+              </a:ext>
+              <a:ext uri="{C183D7F6-B498-43B3-948B-1728B52AA6E4}">
+                <adec:decorative xmlns:adec="http://schemas.microsoft.com/office/drawing/2017/decorative" val="1"/>
+              </a:ext>
+            </a:extLst>
+          </p:cNvPr>
+          <p:cNvSpPr>
+            <a:spLocks noGrp="1" noRot="1" noChangeAspect="1" noMove="1" noResize="1" noEditPoints="1" noAdjustHandles="1" noChangeArrowheads="1" noChangeShapeType="1" noTextEdit="1"/>
+          </p:cNvSpPr>
+          <p:nvPr>
+            <p:extLst>
+              <p:ext uri="{386F3935-93C4-4BCD-93E2-E3B085C9AB24}">
+                <p16:designElem xmlns:p16="http://schemas.microsoft.com/office/powerpoint/2015/main" val="1"/>
+              </p:ext>
+            </p:extLst>
+          </p:nvPr>
+        </p:nvSpPr>
+        <p:spPr>
+          <a:xfrm>
+            <a:off x="7828359" y="0"/>
+            <a:ext cx="514350" cy="857250"/>
+          </a:xfrm>
+          <a:prstGeom prst="rect">
+            <a:avLst/>
+          </a:prstGeom>
+          <a:solidFill>
+            <a:schemeClr val="accent1"/>
+          </a:solidFill>
+          <a:ln>
+            <a:noFill/>
+          </a:ln>
+        </p:spPr>
+        <p:style>
+          <a:lnRef idx="1">
+            <a:schemeClr val="accent1"/>
+          </a:lnRef>
+          <a:fillRef idx="3">
+            <a:schemeClr val="accent1"/>
+          </a:fillRef>
+          <a:effectRef idx="2">
+            <a:schemeClr val="accent1"/>
+          </a:effectRef>
+          <a:fontRef idx="minor">
+            <a:schemeClr val="lt1"/>
+          </a:fontRef>
+        </p:style>
+        <p:txBody>
+          <a:bodyPr/>
+          <a:lstStyle/>
+          <a:p>
+            <a:endParaRPr lang="en-US"/>
+          </a:p>
+        </p:txBody>
+      </p:sp>
+      <p:sp>
+        <p:nvSpPr>
+          <p:cNvPr id="2" name="Title 1">
+            <a:extLst>
+              <a:ext uri="{FF2B5EF4-FFF2-40B4-BE49-F238E27FC236}">
+                <a16:creationId xmlns:a16="http://schemas.microsoft.com/office/drawing/2014/main" id="{C7A19C54-362B-D995-424B-82E2D3C799F7}"/>
+              </a:ext>
+            </a:extLst>
+          </p:cNvPr>
+          <p:cNvSpPr>
+            <a:spLocks noGrp="1"/>
+          </p:cNvSpPr>
+          <p:nvPr>
+            <p:ph type="title"/>
+          </p:nvPr>
+        </p:nvSpPr>
+        <p:spPr>
+          <a:xfrm>
+            <a:off x="1262378" y="857250"/>
+            <a:ext cx="6619243" cy="2541912"/>
+          </a:xfrm>
+        </p:spPr>
+        <p:txBody>
+          <a:bodyPr vert="horz" lIns="91440" tIns="45720" rIns="91440" bIns="45720" rtlCol="0" anchor="ctr">
+            <a:normAutofit/>
+          </a:bodyPr>
+          <a:lstStyle/>
+          <a:p>
+            <a:pPr algn="ctr" defTabSz="457200"/>
+            <a:r>
+              <a:rPr lang="en-US" sz="5000">
+                <a:solidFill>
+                  <a:srgbClr val="FFFFFF"/>
+                </a:solidFill>
+              </a:rPr>
+              <a:t>AJB4APP – Github Repo Link</a:t>
+            </a:r>
+          </a:p>
+        </p:txBody>
+      </p:sp>
+      <p:sp>
+        <p:nvSpPr>
+          <p:cNvPr id="3" name="Text Placeholder 2">
+            <a:extLst>
+              <a:ext uri="{FF2B5EF4-FFF2-40B4-BE49-F238E27FC236}">
+                <a16:creationId xmlns:a16="http://schemas.microsoft.com/office/drawing/2014/main" id="{F59D3750-3F53-D44D-03C4-7C8DE4FBA701}"/>
+              </a:ext>
+            </a:extLst>
+          </p:cNvPr>
+          <p:cNvSpPr>
+            <a:spLocks noGrp="1"/>
+          </p:cNvSpPr>
+          <p:nvPr>
+            <p:ph type="body" idx="1"/>
+          </p:nvPr>
+        </p:nvSpPr>
+        <p:spPr>
+          <a:xfrm>
+            <a:off x="1262378" y="3930638"/>
+            <a:ext cx="6619243" cy="621699"/>
+          </a:xfrm>
+        </p:spPr>
+        <p:txBody>
+          <a:bodyPr vert="horz" lIns="91440" tIns="45720" rIns="91440" bIns="45720" rtlCol="0" anchor="t">
+            <a:normAutofit/>
+          </a:bodyPr>
+          <a:lstStyle/>
+          <a:p>
+            <a:pPr algn="ctr" defTabSz="457200">
+              <a:lnSpc>
+                <a:spcPct val="90000"/>
+              </a:lnSpc>
+              <a:spcBef>
+                <a:spcPts val="1000"/>
+              </a:spcBef>
+            </a:pPr>
+            <a:r>
+              <a:rPr lang="en-US" sz="1800" dirty="0">
+                <a:solidFill>
+                  <a:schemeClr val="tx2"/>
+                </a:solidFill>
+                <a:hlinkClick r:id="rId3"/>
+              </a:rPr>
+              <a:t>https://github.com/2024mt12104/Flutter_Back4App/tree/main?tab=readme-ov-file</a:t>
+            </a:r>
+            <a:endParaRPr lang="en-US" sz="1800" dirty="0">
+              <a:solidFill>
+                <a:schemeClr val="tx2"/>
+              </a:solidFill>
+            </a:endParaRPr>
+          </a:p>
+        </p:txBody>
+      </p:sp>
+    </p:spTree>
+    <p:extLst>
+      <p:ext uri="{BB962C8B-B14F-4D97-AF65-F5344CB8AC3E}">
+        <p14:creationId xmlns:p14="http://schemas.microsoft.com/office/powerpoint/2010/main" val="4129346970"/>
+      </p:ext>
+    </p:extLst>
+  </p:cSld>
+  <p:clrMapOvr>
+    <a:masterClrMapping/>
+  </p:clrMapOvr>
+</p:sld>
+</file>
+
+<file path=ppt/slides/slide15.xml><?xml version="1.0" encoding="utf-8"?>
+<p:sld xmlns:a="http://schemas.openxmlformats.org/drawingml/2006/main" xmlns:r="http://schemas.openxmlformats.org/officeDocument/2006/relationships" xmlns:p="http://schemas.openxmlformats.org/presentationml/2006/main">
+  <p:cSld>
+    <p:bg>
+      <p:bgPr>
+        <a:blipFill rotWithShape="1">
+          <a:blip r:embed="rId2">
+            <a:duotone>
+              <a:schemeClr val="bg1">
+                <a:shade val="69000"/>
+                <a:hueMod val="91000"/>
+                <a:satMod val="164000"/>
+                <a:lumMod val="74000"/>
+              </a:schemeClr>
+              <a:schemeClr val="bg1">
+                <a:hueMod val="124000"/>
+                <a:satMod val="140000"/>
+                <a:lumMod val="142000"/>
+              </a:schemeClr>
+            </a:duotone>
+          </a:blip>
+          <a:stretch/>
+        </a:blipFill>
+        <a:effectLst/>
+      </p:bgPr>
+    </p:bg>
+    <p:spTree>
+      <p:nvGrpSpPr>
+        <p:cNvPr id="1" name="">
+          <a:extLst>
+            <a:ext uri="{FF2B5EF4-FFF2-40B4-BE49-F238E27FC236}">
+              <a16:creationId xmlns:a16="http://schemas.microsoft.com/office/drawing/2014/main" id="{B6D488D7-D8E5-FD2D-9569-FB76201667E1}"/>
+            </a:ext>
+          </a:extLst>
+        </p:cNvPr>
+        <p:cNvGrpSpPr/>
+        <p:nvPr/>
+      </p:nvGrpSpPr>
+      <p:grpSpPr>
+        <a:xfrm>
+          <a:off x="0" y="0"/>
+          <a:ext cx="0" cy="0"/>
+          <a:chOff x="0" y="0"/>
+          <a:chExt cx="0" cy="0"/>
+        </a:xfrm>
+      </p:grpSpPr>
+      <p:grpSp>
+        <p:nvGrpSpPr>
+          <p:cNvPr id="7" name="Group 6">
+            <a:extLst>
+              <a:ext uri="{FF2B5EF4-FFF2-40B4-BE49-F238E27FC236}">
+                <a16:creationId xmlns:a16="http://schemas.microsoft.com/office/drawing/2014/main" id="{D6EA7399-199A-F3F7-AB71-AA880FDD8253}"/>
+              </a:ext>
+              <a:ext uri="{C183D7F6-B498-43B3-948B-1728B52AA6E4}">
+                <adec:decorative xmlns:adec="http://schemas.microsoft.com/office/drawing/2017/decorative" val="1"/>
+              </a:ext>
+            </a:extLst>
+          </p:cNvPr>
+          <p:cNvGrpSpPr>
+            <a:grpSpLocks noGrp="1" noUngrp="1" noRot="1" noChangeAspect="1" noMove="1" noResize="1"/>
+          </p:cNvGrpSpPr>
+          <p:nvPr>
+            <p:extLst>
+              <p:ext uri="{386F3935-93C4-4BCD-93E2-E3B085C9AB24}">
+                <p16:designElem xmlns:p16="http://schemas.microsoft.com/office/powerpoint/2015/main" val="1"/>
+              </p:ext>
+            </p:extLst>
+          </p:nvPr>
+        </p:nvGrpSpPr>
+        <p:grpSpPr>
+          <a:xfrm>
+            <a:off x="0" y="0"/>
+            <a:ext cx="9144000" cy="5143500"/>
+            <a:chOff x="0" y="0"/>
+            <a:chExt cx="12192000" cy="6858000"/>
+          </a:xfrm>
+        </p:grpSpPr>
+        <p:sp>
+          <p:nvSpPr>
+            <p:cNvPr id="8" name="Rectangle 7">
+              <a:extLst>
+                <a:ext uri="{FF2B5EF4-FFF2-40B4-BE49-F238E27FC236}">
+                  <a16:creationId xmlns:a16="http://schemas.microsoft.com/office/drawing/2014/main" id="{F108BE82-453D-5D49-296B-000253EDE72C}"/>
+                </a:ext>
+                <a:ext uri="{C183D7F6-B498-43B3-948B-1728B52AA6E4}">
+                  <adec:decorative xmlns:adec="http://schemas.microsoft.com/office/drawing/2017/decorative" val="1"/>
+                </a:ext>
+              </a:extLst>
+            </p:cNvPr>
+            <p:cNvSpPr/>
+            <p:nvPr>
+              <p:extLst>
+                <p:ext uri="{386F3935-93C4-4BCD-93E2-E3B085C9AB24}">
+                  <p16:designElem xmlns:p16="http://schemas.microsoft.com/office/powerpoint/2015/main" val="1"/>
+                </p:ext>
+              </p:extLst>
+            </p:nvPr>
+          </p:nvSpPr>
+          <p:spPr>
+            <a:xfrm>
+              <a:off x="0" y="0"/>
+              <a:ext cx="12192000" cy="6858000"/>
+            </a:xfrm>
+            <a:prstGeom prst="rect">
+              <a:avLst/>
+            </a:prstGeom>
+            <a:blipFill>
+              <a:blip r:embed="rId2">
+                <a:duotone>
+                  <a:schemeClr val="dk2">
+                    <a:shade val="69000"/>
+                    <a:hueMod val="91000"/>
+                    <a:satMod val="164000"/>
+                    <a:lumMod val="74000"/>
+                  </a:schemeClr>
+                  <a:schemeClr val="dk2">
+                    <a:hueMod val="124000"/>
+                    <a:satMod val="140000"/>
+                    <a:lumMod val="142000"/>
+                  </a:schemeClr>
+                </a:duotone>
+              </a:blip>
+              <a:stretch>
+                <a:fillRect/>
+              </a:stretch>
+            </a:blipFill>
+            <a:ln>
+              <a:noFill/>
+            </a:ln>
+          </p:spPr>
+          <p:style>
+            <a:lnRef idx="2">
+              <a:schemeClr val="accent1">
+                <a:shade val="50000"/>
+              </a:schemeClr>
+            </a:lnRef>
+            <a:fillRef idx="1">
+              <a:schemeClr val="accent1"/>
+            </a:fillRef>
+            <a:effectRef idx="0">
+              <a:schemeClr val="accent1"/>
+            </a:effectRef>
+            <a:fontRef idx="minor">
+              <a:schemeClr val="lt1"/>
+            </a:fontRef>
+          </p:style>
+          <p:txBody>
+            <a:bodyPr/>
+            <a:lstStyle/>
+            <a:p>
+              <a:endParaRPr lang="en-US"/>
+            </a:p>
+          </p:txBody>
+        </p:sp>
+        <p:sp>
+          <p:nvSpPr>
+            <p:cNvPr id="9" name="Freeform 5">
+              <a:extLst>
+                <a:ext uri="{FF2B5EF4-FFF2-40B4-BE49-F238E27FC236}">
+                  <a16:creationId xmlns:a16="http://schemas.microsoft.com/office/drawing/2014/main" id="{8A8E2D0B-3A64-45EF-6128-A2C8E49854FF}"/>
+                </a:ext>
+                <a:ext uri="{C183D7F6-B498-43B3-948B-1728B52AA6E4}">
+                  <adec:decorative xmlns:adec="http://schemas.microsoft.com/office/drawing/2017/decorative" val="1"/>
+                </a:ext>
+              </a:extLst>
+            </p:cNvPr>
+            <p:cNvSpPr>
+              <a:spLocks noEditPoints="1"/>
+            </p:cNvSpPr>
+            <p:nvPr>
+              <p:extLst>
+                <p:ext uri="{386F3935-93C4-4BCD-93E2-E3B085C9AB24}">
+                  <p16:designElem xmlns:p16="http://schemas.microsoft.com/office/powerpoint/2015/main" val="1"/>
+                </p:ext>
+              </p:extLst>
+            </p:nvPr>
+          </p:nvSpPr>
+          <p:spPr bwMode="gray">
+            <a:xfrm>
+              <a:off x="0" y="1587"/>
+              <a:ext cx="12192000" cy="6856413"/>
+            </a:xfrm>
+            <a:custGeom>
+              <a:avLst/>
+              <a:gdLst/>
+              <a:ahLst/>
+              <a:cxnLst/>
+              <a:rect l="0" t="0" r="r" b="b"/>
+              <a:pathLst>
+                <a:path w="15356" h="8638">
+                  <a:moveTo>
+                    <a:pt x="0" y="0"/>
+                  </a:moveTo>
+                  <a:lnTo>
+                    <a:pt x="0" y="8638"/>
+                  </a:lnTo>
+                  <a:lnTo>
+                    <a:pt x="15356" y="8638"/>
+                  </a:lnTo>
+                  <a:lnTo>
+                    <a:pt x="15356" y="0"/>
+                  </a:lnTo>
+                  <a:lnTo>
+                    <a:pt x="0" y="0"/>
+                  </a:lnTo>
+                  <a:close/>
+                  <a:moveTo>
+                    <a:pt x="14748" y="8038"/>
+                  </a:moveTo>
+                  <a:lnTo>
+                    <a:pt x="600" y="8038"/>
+                  </a:lnTo>
+                  <a:lnTo>
+                    <a:pt x="600" y="592"/>
+                  </a:lnTo>
+                  <a:lnTo>
+                    <a:pt x="14748" y="592"/>
+                  </a:lnTo>
+                  <a:lnTo>
+                    <a:pt x="14748" y="8038"/>
+                  </a:lnTo>
+                  <a:close/>
+                </a:path>
+              </a:pathLst>
+            </a:custGeom>
+            <a:solidFill>
+              <a:schemeClr val="bg1"/>
+            </a:solidFill>
+            <a:ln>
+              <a:noFill/>
+            </a:ln>
+          </p:spPr>
+          <p:txBody>
+            <a:bodyPr/>
+            <a:lstStyle/>
+            <a:p>
+              <a:endParaRPr lang="en-US"/>
+            </a:p>
+          </p:txBody>
+        </p:sp>
+      </p:grpSp>
+      <p:sp>
+        <p:nvSpPr>
+          <p:cNvPr id="11" name="Rectangle 10">
+            <a:extLst>
+              <a:ext uri="{FF2B5EF4-FFF2-40B4-BE49-F238E27FC236}">
+                <a16:creationId xmlns:a16="http://schemas.microsoft.com/office/drawing/2014/main" id="{F4169429-C3E9-92F7-4B08-F99648AD2E5C}"/>
+              </a:ext>
+              <a:ext uri="{C183D7F6-B498-43B3-948B-1728B52AA6E4}">
+                <adec:decorative xmlns:adec="http://schemas.microsoft.com/office/drawing/2017/decorative" val="1"/>
+              </a:ext>
+            </a:extLst>
+          </p:cNvPr>
+          <p:cNvSpPr>
+            <a:spLocks noGrp="1" noRot="1" noChangeAspect="1" noMove="1" noResize="1" noEditPoints="1" noAdjustHandles="1" noChangeArrowheads="1" noChangeShapeType="1" noTextEdit="1"/>
+          </p:cNvSpPr>
+          <p:nvPr>
+            <p:extLst>
+              <p:ext uri="{386F3935-93C4-4BCD-93E2-E3B085C9AB24}">
+                <p16:designElem xmlns:p16="http://schemas.microsoft.com/office/powerpoint/2015/main" val="1"/>
+              </p:ext>
+            </p:extLst>
+          </p:nvPr>
+        </p:nvSpPr>
+        <p:spPr>
+          <a:xfrm>
+            <a:off x="7828359" y="0"/>
+            <a:ext cx="514350" cy="857250"/>
+          </a:xfrm>
+          <a:prstGeom prst="rect">
+            <a:avLst/>
+          </a:prstGeom>
+          <a:solidFill>
+            <a:schemeClr val="accent1"/>
+          </a:solidFill>
+          <a:ln>
+            <a:noFill/>
+          </a:ln>
+        </p:spPr>
+        <p:style>
+          <a:lnRef idx="1">
+            <a:schemeClr val="accent1"/>
+          </a:lnRef>
+          <a:fillRef idx="3">
+            <a:schemeClr val="accent1"/>
+          </a:fillRef>
+          <a:effectRef idx="2">
+            <a:schemeClr val="accent1"/>
+          </a:effectRef>
+          <a:fontRef idx="minor">
+            <a:schemeClr val="lt1"/>
+          </a:fontRef>
+        </p:style>
+        <p:txBody>
+          <a:bodyPr/>
+          <a:lstStyle/>
+          <a:p>
+            <a:endParaRPr lang="en-US"/>
+          </a:p>
+        </p:txBody>
+      </p:sp>
+      <p:sp>
+        <p:nvSpPr>
+          <p:cNvPr id="13" name="Rectangle 12">
+            <a:extLst>
+              <a:ext uri="{FF2B5EF4-FFF2-40B4-BE49-F238E27FC236}">
+                <a16:creationId xmlns:a16="http://schemas.microsoft.com/office/drawing/2014/main" id="{B3982734-48C7-89B0-4058-28A70E084246}"/>
+              </a:ext>
+              <a:ext uri="{C183D7F6-B498-43B3-948B-1728B52AA6E4}">
+                <adec:decorative xmlns:adec="http://schemas.microsoft.com/office/drawing/2017/decorative" val="1"/>
+              </a:ext>
+            </a:extLst>
+          </p:cNvPr>
+          <p:cNvSpPr>
+            <a:spLocks noGrp="1" noRot="1" noChangeAspect="1" noMove="1" noResize="1" noEditPoints="1" noAdjustHandles="1" noChangeArrowheads="1" noChangeShapeType="1" noTextEdit="1"/>
+          </p:cNvSpPr>
+          <p:nvPr>
+            <p:extLst>
+              <p:ext uri="{386F3935-93C4-4BCD-93E2-E3B085C9AB24}">
+                <p16:designElem xmlns:p16="http://schemas.microsoft.com/office/powerpoint/2015/main" val="1"/>
+              </p:ext>
+            </p:extLst>
+          </p:nvPr>
+        </p:nvSpPr>
+        <p:spPr>
+          <a:xfrm>
+            <a:off x="0" y="0"/>
+            <a:ext cx="9144000" cy="5143500"/>
+          </a:xfrm>
+          <a:prstGeom prst="rect">
+            <a:avLst/>
+          </a:prstGeom>
+          <a:solidFill>
+            <a:schemeClr val="bg1"/>
+          </a:solidFill>
+          <a:ln>
+            <a:noFill/>
+          </a:ln>
+        </p:spPr>
+        <p:style>
+          <a:lnRef idx="2">
+            <a:schemeClr val="accent1">
+              <a:shade val="50000"/>
+            </a:schemeClr>
+          </a:lnRef>
+          <a:fillRef idx="1">
+            <a:schemeClr val="accent1"/>
+          </a:fillRef>
+          <a:effectRef idx="0">
+            <a:schemeClr val="accent1"/>
+          </a:effectRef>
+          <a:fontRef idx="minor">
+            <a:schemeClr val="lt1"/>
+          </a:fontRef>
+        </p:style>
+        <p:txBody>
+          <a:bodyPr rtlCol="0" anchor="ctr"/>
+          <a:lstStyle/>
+          <a:p>
+            <a:pPr algn="ctr"/>
+            <a:endParaRPr lang="en-US"/>
+          </a:p>
+        </p:txBody>
+      </p:sp>
+      <p:sp>
+        <p:nvSpPr>
+          <p:cNvPr id="15" name="Rectangle 14">
+            <a:extLst>
+              <a:ext uri="{FF2B5EF4-FFF2-40B4-BE49-F238E27FC236}">
+                <a16:creationId xmlns:a16="http://schemas.microsoft.com/office/drawing/2014/main" id="{A5E22FC5-9479-A324-6AF3-F22D33ECF64C}"/>
+              </a:ext>
+              <a:ext uri="{C183D7F6-B498-43B3-948B-1728B52AA6E4}">
+                <adec:decorative xmlns:adec="http://schemas.microsoft.com/office/drawing/2017/decorative" val="1"/>
+              </a:ext>
+            </a:extLst>
+          </p:cNvPr>
+          <p:cNvSpPr>
+            <a:spLocks noGrp="1" noRot="1" noChangeAspect="1" noMove="1" noResize="1" noEditPoints="1" noAdjustHandles="1" noChangeArrowheads="1" noChangeShapeType="1" noTextEdit="1"/>
+          </p:cNvSpPr>
+          <p:nvPr>
+            <p:extLst>
+              <p:ext uri="{386F3935-93C4-4BCD-93E2-E3B085C9AB24}">
+                <p16:designElem xmlns:p16="http://schemas.microsoft.com/office/powerpoint/2015/main" val="1"/>
+              </p:ext>
+            </p:extLst>
+          </p:nvPr>
+        </p:nvSpPr>
+        <p:spPr>
+          <a:xfrm>
+            <a:off x="8263154" y="350547"/>
+            <a:ext cx="521872" cy="4439337"/>
+          </a:xfrm>
+          <a:prstGeom prst="rect">
+            <a:avLst/>
+          </a:prstGeom>
+          <a:solidFill>
+            <a:schemeClr val="accent1"/>
+          </a:solidFill>
+          <a:ln>
+            <a:noFill/>
+          </a:ln>
+          <a:effectLst/>
+        </p:spPr>
+        <p:style>
+          <a:lnRef idx="1">
+            <a:schemeClr val="accent1"/>
+          </a:lnRef>
+          <a:fillRef idx="3">
+            <a:schemeClr val="accent1"/>
+          </a:fillRef>
+          <a:effectRef idx="2">
+            <a:schemeClr val="accent1"/>
+          </a:effectRef>
+          <a:fontRef idx="minor">
+            <a:schemeClr val="lt1"/>
+          </a:fontRef>
+        </p:style>
+        <p:txBody>
+          <a:bodyPr/>
+          <a:lstStyle/>
+          <a:p>
+            <a:endParaRPr lang="en-US"/>
+          </a:p>
+        </p:txBody>
+      </p:sp>
+      <p:grpSp>
+        <p:nvGrpSpPr>
+          <p:cNvPr id="17" name="Group 16">
+            <a:extLst>
+              <a:ext uri="{FF2B5EF4-FFF2-40B4-BE49-F238E27FC236}">
+                <a16:creationId xmlns:a16="http://schemas.microsoft.com/office/drawing/2014/main" id="{57618A4F-174E-6B21-4B13-5B7FD4555829}"/>
+              </a:ext>
+              <a:ext uri="{C183D7F6-B498-43B3-948B-1728B52AA6E4}">
+                <adec:decorative xmlns:adec="http://schemas.microsoft.com/office/drawing/2017/decorative" val="1"/>
+              </a:ext>
+            </a:extLst>
+          </p:cNvPr>
+          <p:cNvGrpSpPr>
+            <a:grpSpLocks noGrp="1" noUngrp="1" noRot="1" noChangeAspect="1" noMove="1" noResize="1"/>
+          </p:cNvGrpSpPr>
+          <p:nvPr>
+            <p:extLst>
+              <p:ext uri="{386F3935-93C4-4BCD-93E2-E3B085C9AB24}">
+                <p16:designElem xmlns:p16="http://schemas.microsoft.com/office/powerpoint/2015/main" val="1"/>
+              </p:ext>
+            </p:extLst>
+          </p:nvPr>
+        </p:nvGrpSpPr>
+        <p:grpSpPr>
+          <a:xfrm>
+            <a:off x="0" y="0"/>
+            <a:ext cx="9144000" cy="5143500"/>
+            <a:chOff x="0" y="0"/>
+            <a:chExt cx="12192000" cy="6858000"/>
+          </a:xfrm>
+          <a:solidFill>
+            <a:srgbClr val="FFFFFF"/>
+          </a:solidFill>
+        </p:grpSpPr>
+        <p:sp>
+          <p:nvSpPr>
+            <p:cNvPr id="18" name="Rectangle 17">
+              <a:extLst>
+                <a:ext uri="{FF2B5EF4-FFF2-40B4-BE49-F238E27FC236}">
+                  <a16:creationId xmlns:a16="http://schemas.microsoft.com/office/drawing/2014/main" id="{71B4B127-6F81-9E4E-9575-C65DEBCA01E8}"/>
+                </a:ext>
+                <a:ext uri="{C183D7F6-B498-43B3-948B-1728B52AA6E4}">
+                  <adec:decorative xmlns:adec="http://schemas.microsoft.com/office/drawing/2017/decorative" val="1"/>
+                </a:ext>
+              </a:extLst>
+            </p:cNvPr>
+            <p:cNvSpPr/>
+            <p:nvPr>
+              <p:extLst>
+                <p:ext uri="{386F3935-93C4-4BCD-93E2-E3B085C9AB24}">
+                  <p16:designElem xmlns:p16="http://schemas.microsoft.com/office/powerpoint/2015/main" val="1"/>
+                </p:ext>
+              </p:extLst>
+            </p:nvPr>
+          </p:nvSpPr>
+          <p:spPr>
+            <a:xfrm>
+              <a:off x="0" y="0"/>
+              <a:ext cx="12192000" cy="6858000"/>
+            </a:xfrm>
+            <a:prstGeom prst="rect">
+              <a:avLst/>
+            </a:prstGeom>
+            <a:noFill/>
+            <a:ln>
+              <a:noFill/>
+            </a:ln>
+          </p:spPr>
+          <p:style>
+            <a:lnRef idx="2">
+              <a:schemeClr val="accent1">
+                <a:shade val="50000"/>
+              </a:schemeClr>
+            </a:lnRef>
+            <a:fillRef idx="1">
+              <a:schemeClr val="accent1"/>
+            </a:fillRef>
+            <a:effectRef idx="0">
+              <a:schemeClr val="accent1"/>
+            </a:effectRef>
+            <a:fontRef idx="minor">
+              <a:schemeClr val="lt1"/>
+            </a:fontRef>
+          </p:style>
+          <p:txBody>
+            <a:bodyPr/>
+            <a:lstStyle/>
+            <a:p>
+              <a:endParaRPr lang="en-US"/>
+            </a:p>
+          </p:txBody>
+        </p:sp>
+        <p:sp useBgFill="1">
+          <p:nvSpPr>
+            <p:cNvPr id="19" name="Freeform 5">
+              <a:extLst>
+                <a:ext uri="{FF2B5EF4-FFF2-40B4-BE49-F238E27FC236}">
+                  <a16:creationId xmlns:a16="http://schemas.microsoft.com/office/drawing/2014/main" id="{1ECD2FE8-4192-F9DA-63C1-5A7976524F27}"/>
+                </a:ext>
+                <a:ext uri="{C183D7F6-B498-43B3-948B-1728B52AA6E4}">
+                  <adec:decorative xmlns:adec="http://schemas.microsoft.com/office/drawing/2017/decorative" val="1"/>
+                </a:ext>
+              </a:extLst>
+            </p:cNvPr>
+            <p:cNvSpPr>
+              <a:spLocks noEditPoints="1"/>
+            </p:cNvSpPr>
+            <p:nvPr>
+              <p:extLst>
+                <p:ext uri="{386F3935-93C4-4BCD-93E2-E3B085C9AB24}">
+                  <p16:designElem xmlns:p16="http://schemas.microsoft.com/office/powerpoint/2015/main" val="1"/>
+                </p:ext>
+              </p:extLst>
+            </p:nvPr>
+          </p:nvSpPr>
+          <p:spPr bwMode="gray">
+            <a:xfrm>
+              <a:off x="0" y="1587"/>
+              <a:ext cx="12192000" cy="6856413"/>
+            </a:xfrm>
+            <a:custGeom>
+              <a:avLst/>
+              <a:gdLst/>
+              <a:ahLst/>
+              <a:cxnLst/>
+              <a:rect l="0" t="0" r="r" b="b"/>
+              <a:pathLst>
+                <a:path w="15356" h="8638">
+                  <a:moveTo>
+                    <a:pt x="0" y="0"/>
+                  </a:moveTo>
+                  <a:lnTo>
+                    <a:pt x="0" y="8638"/>
+                  </a:lnTo>
+                  <a:lnTo>
+                    <a:pt x="15356" y="8638"/>
+                  </a:lnTo>
+                  <a:lnTo>
+                    <a:pt x="15356" y="0"/>
+                  </a:lnTo>
+                  <a:lnTo>
+                    <a:pt x="0" y="0"/>
+                  </a:lnTo>
+                  <a:close/>
+                  <a:moveTo>
+                    <a:pt x="14748" y="8038"/>
+                  </a:moveTo>
+                  <a:lnTo>
+                    <a:pt x="600" y="8038"/>
+                  </a:lnTo>
+                  <a:lnTo>
+                    <a:pt x="600" y="592"/>
+                  </a:lnTo>
+                  <a:lnTo>
+                    <a:pt x="14748" y="592"/>
+                  </a:lnTo>
+                  <a:lnTo>
+                    <a:pt x="14748" y="8038"/>
+                  </a:lnTo>
+                  <a:close/>
+                </a:path>
+              </a:pathLst>
+            </a:custGeom>
+            <a:ln>
+              <a:noFill/>
+            </a:ln>
+          </p:spPr>
+          <p:txBody>
+            <a:bodyPr/>
+            <a:lstStyle/>
+            <a:p>
+              <a:endParaRPr lang="en-US"/>
+            </a:p>
+          </p:txBody>
+        </p:sp>
+      </p:grpSp>
+      <p:sp>
+        <p:nvSpPr>
+          <p:cNvPr id="2" name="Title 1">
+            <a:extLst>
+              <a:ext uri="{FF2B5EF4-FFF2-40B4-BE49-F238E27FC236}">
+                <a16:creationId xmlns:a16="http://schemas.microsoft.com/office/drawing/2014/main" id="{138B1544-B388-3561-8406-0CE0923A8038}"/>
+              </a:ext>
+            </a:extLst>
+          </p:cNvPr>
+          <p:cNvSpPr>
+            <a:spLocks noGrp="1"/>
+          </p:cNvSpPr>
+          <p:nvPr>
+            <p:ph type="title"/>
+          </p:nvPr>
+        </p:nvSpPr>
+        <p:spPr>
+          <a:xfrm>
+            <a:off x="3152274" y="915945"/>
+            <a:ext cx="4447131" cy="3311610"/>
+          </a:xfrm>
+        </p:spPr>
+        <p:txBody>
+          <a:bodyPr vert="horz" lIns="91440" tIns="45720" rIns="91440" bIns="45720" rtlCol="0" anchor="ctr">
+            <a:normAutofit/>
+          </a:bodyPr>
+          <a:lstStyle/>
+          <a:p>
+            <a:pPr marL="0" lvl="0" indent="0" defTabSz="457200"/>
+            <a:r>
+              <a:rPr lang="en-US" sz="5400" dirty="0">
+                <a:solidFill>
+                  <a:schemeClr val="tx2"/>
+                </a:solidFill>
+              </a:rPr>
+              <a:t>7.Conclusion</a:t>
+            </a:r>
+          </a:p>
+        </p:txBody>
+      </p:sp>
+      <p:cxnSp>
+        <p:nvCxnSpPr>
+          <p:cNvPr id="21" name="Straight Connector 20">
+            <a:extLst>
+              <a:ext uri="{FF2B5EF4-FFF2-40B4-BE49-F238E27FC236}">
+                <a16:creationId xmlns:a16="http://schemas.microsoft.com/office/drawing/2014/main" id="{5D74CB42-A3B6-1BB0-63E5-A496FD04417D}"/>
+              </a:ext>
+              <a:ext uri="{C183D7F6-B498-43B3-948B-1728B52AA6E4}">
+                <adec:decorative xmlns:adec="http://schemas.microsoft.com/office/drawing/2017/decorative" val="1"/>
+              </a:ext>
+            </a:extLst>
+          </p:cNvPr>
+          <p:cNvCxnSpPr>
+            <a:cxnSpLocks noGrp="1" noRot="1" noChangeAspect="1" noMove="1" noResize="1" noEditPoints="1" noAdjustHandles="1" noChangeArrowheads="1" noChangeShapeType="1"/>
+          </p:cNvCxnSpPr>
+          <p:nvPr>
+            <p:extLst>
+              <p:ext uri="{386F3935-93C4-4BCD-93E2-E3B085C9AB24}">
+                <p16:designElem xmlns:p16="http://schemas.microsoft.com/office/powerpoint/2015/main" val="1"/>
+              </p:ext>
+            </p:extLst>
+          </p:nvPr>
+        </p:nvCxnSpPr>
+        <p:spPr>
+          <a:xfrm>
+            <a:off x="3267515" y="1448239"/>
+            <a:ext cx="0" cy="2400300"/>
+          </a:xfrm>
+          <a:prstGeom prst="line">
+            <a:avLst/>
+          </a:prstGeom>
+          <a:ln w="15875" cap="sq">
+            <a:solidFill>
+              <a:schemeClr val="accent1">
+                <a:lumMod val="75000"/>
+              </a:schemeClr>
+            </a:solidFill>
+            <a:miter lim="800000"/>
+          </a:ln>
+        </p:spPr>
+        <p:style>
+          <a:lnRef idx="1">
+            <a:schemeClr val="accent1"/>
+          </a:lnRef>
+          <a:fillRef idx="0">
+            <a:schemeClr val="accent1"/>
+          </a:fillRef>
+          <a:effectRef idx="0">
+            <a:schemeClr val="accent1"/>
+          </a:effectRef>
+          <a:fontRef idx="minor">
+            <a:schemeClr val="tx1"/>
+          </a:fontRef>
+        </p:style>
+      </p:cxnSp>
+    </p:spTree>
+    <p:extLst>
+      <p:ext uri="{BB962C8B-B14F-4D97-AF65-F5344CB8AC3E}">
+        <p14:creationId xmlns:p14="http://schemas.microsoft.com/office/powerpoint/2010/main" val="374230070"/>
+      </p:ext>
+    </p:extLst>
+  </p:cSld>
+  <p:clrMapOvr>
+    <a:masterClrMapping/>
+  </p:clrMapOvr>
+</p:sld>
+</file>
+
+<file path=ppt/slides/slide16.xml><?xml version="1.0" encoding="utf-8"?>
 <p:sld xmlns:a="http://schemas.openxmlformats.org/drawingml/2006/main" xmlns:r="http://schemas.openxmlformats.org/officeDocument/2006/relationships" xmlns:p="http://schemas.openxmlformats.org/presentationml/2006/main">
   <p:cSld>
     <p:bg>
@@ -30497,7 +32134,7 @@
               <a:buNone/>
             </a:pPr>
             <a:r>
-              <a:rPr lang="en-IN" sz="1200">
+              <a:rPr lang="en-IN" sz="1200" dirty="0">
                 <a:solidFill>
                   <a:srgbClr val="FFFFFF"/>
                 </a:solidFill>
@@ -30505,14 +32142,14 @@
               <a:t>✅ Fully functional cross-platform app</a:t>
             </a:r>
             <a:br>
-              <a:rPr lang="en-IN" sz="1200">
+              <a:rPr lang="en-IN" sz="1200" dirty="0">
                 <a:solidFill>
                   <a:srgbClr val="FFFFFF"/>
                 </a:solidFill>
               </a:rPr>
             </a:br>
             <a:r>
-              <a:rPr lang="en-IN" sz="1200">
+              <a:rPr lang="en-IN" sz="1200" dirty="0">
                 <a:solidFill>
                   <a:srgbClr val="FFFFFF"/>
                 </a:solidFill>
@@ -30520,14 +32157,14 @@
               <a:t>✅ Secure cloud integration</a:t>
             </a:r>
             <a:br>
-              <a:rPr lang="en-IN" sz="1200">
+              <a:rPr lang="en-IN" sz="1200" dirty="0">
                 <a:solidFill>
                   <a:srgbClr val="FFFFFF"/>
                 </a:solidFill>
               </a:rPr>
             </a:br>
             <a:r>
-              <a:rPr lang="en-IN" sz="1200">
+              <a:rPr lang="en-IN" sz="1200" dirty="0">
                 <a:solidFill>
                   <a:srgbClr val="FFFFFF"/>
                 </a:solidFill>
@@ -30535,14 +32172,14 @@
               <a:t>✅ Professional UI/UX design</a:t>
             </a:r>
             <a:br>
-              <a:rPr lang="en-IN" sz="1200">
+              <a:rPr lang="en-IN" sz="1200" dirty="0">
                 <a:solidFill>
                   <a:srgbClr val="FFFFFF"/>
                 </a:solidFill>
               </a:rPr>
             </a:br>
             <a:r>
-              <a:rPr lang="en-IN" sz="1200">
+              <a:rPr lang="en-IN" sz="1200" dirty="0">
                 <a:solidFill>
                   <a:srgbClr val="FFFFFF"/>
                 </a:solidFill>
@@ -30550,14 +32187,14 @@
               <a:t>✅ Comprehensive testing</a:t>
             </a:r>
             <a:br>
-              <a:rPr lang="en-IN" sz="1200">
+              <a:rPr lang="en-IN" sz="1200" dirty="0">
                 <a:solidFill>
                   <a:srgbClr val="FFFFFF"/>
                 </a:solidFill>
               </a:rPr>
             </a:br>
             <a:r>
-              <a:rPr lang="en-IN" sz="1200">
+              <a:rPr lang="en-IN" sz="1200" dirty="0">
                 <a:solidFill>
                   <a:srgbClr val="FFFFFF"/>
                 </a:solidFill>
@@ -30570,7 +32207,7 @@
               <a:buNone/>
             </a:pPr>
             <a:r>
-              <a:rPr lang="en-IN" sz="1200" b="1">
+              <a:rPr lang="en-IN" sz="1200" b="1" dirty="0">
                 <a:solidFill>
                   <a:srgbClr val="FFFFFF"/>
                 </a:solidFill>
@@ -30578,14 +32215,14 @@
               <a:t>Thank You!</a:t>
             </a:r>
             <a:br>
-              <a:rPr lang="en-IN" sz="1200">
+              <a:rPr lang="en-IN" sz="1200" dirty="0">
                 <a:solidFill>
                   <a:srgbClr val="FFFFFF"/>
                 </a:solidFill>
               </a:rPr>
             </a:br>
             <a:r>
-              <a:rPr lang="en-IN" sz="1200">
+              <a:rPr lang="en-IN" sz="1200" dirty="0">
                 <a:solidFill>
                   <a:srgbClr val="FFFFFF"/>
                 </a:solidFill>
@@ -30598,7 +32235,7 @@
               <a:buNone/>
             </a:pPr>
             <a:r>
-              <a:rPr lang="en-IN" sz="1200" b="1">
+              <a:rPr lang="en-IN" sz="1200" b="1" dirty="0">
                 <a:solidFill>
                   <a:srgbClr val="FFFFFF"/>
                 </a:solidFill>
@@ -30606,7 +32243,7 @@
               <a:t>Contact:</a:t>
             </a:r>
             <a:r>
-              <a:rPr lang="en-IN" sz="1200">
+              <a:rPr lang="en-IN" sz="1200" dirty="0">
                 <a:solidFill>
                   <a:srgbClr val="FFFFFF"/>
                 </a:solidFill>
@@ -30614,14 +32251,14 @@
               <a:t> 2024mt12104@wilp.bits-pilani.ac.in</a:t>
             </a:r>
             <a:br>
-              <a:rPr lang="en-IN" sz="1200">
+              <a:rPr lang="en-IN" sz="1200" dirty="0">
                 <a:solidFill>
                   <a:srgbClr val="FFFFFF"/>
                 </a:solidFill>
               </a:rPr>
             </a:br>
             <a:r>
-              <a:rPr lang="en-IN" sz="1200" b="1">
+              <a:rPr lang="en-IN" sz="1200" b="1" dirty="0">
                 <a:solidFill>
                   <a:srgbClr val="FFFFFF"/>
                 </a:solidFill>
@@ -30629,13 +32266,27 @@
               <a:t>GitHub:</a:t>
             </a:r>
             <a:r>
-              <a:rPr lang="en-IN" sz="1200">
+              <a:rPr lang="en-IN" sz="1200" dirty="0">
                 <a:solidFill>
                   <a:srgbClr val="FFFFFF"/>
                 </a:solidFill>
               </a:rPr>
-              <a:t> 2024mt12104/Flutter_Back4App</a:t>
+              <a:t> </a:t>
             </a:r>
+            <a:r>
+              <a:rPr lang="en-IN" sz="1200" dirty="0">
+                <a:solidFill>
+                  <a:srgbClr val="FFFFFF"/>
+                </a:solidFill>
+                <a:hlinkClick r:id="rId4"/>
+              </a:rPr>
+              <a:t>2024mt12104/Flutter_Back4App</a:t>
+            </a:r>
+            <a:endParaRPr lang="en-IN" sz="1200" dirty="0">
+              <a:solidFill>
+                <a:srgbClr val="FFFFFF"/>
+              </a:solidFill>
+            </a:endParaRPr>
           </a:p>
         </p:txBody>
       </p:sp>

</xml_diff>